<commit_message>
Slide modifications for overlapping chunks
* Fixed sizes on the POC solution

* Add chunks safe 1 & 2 instead of 1/2
</commit_message>
<xml_diff>
--- a/challenges/fd_poison/FdOverwrite.pptx
+++ b/challenges/fd_poison/FdOverwrite.pptx
@@ -5,7 +5,7 @@
     <p:sldMasterId id="2147483660" r:id="rId1"/>
   </p:sldMasterIdLst>
   <p:notesMasterIdLst>
-    <p:notesMasterId r:id="rId84"/>
+    <p:notesMasterId r:id="rId85"/>
   </p:notesMasterIdLst>
   <p:sldIdLst>
     <p:sldId id="327" r:id="rId2"/>
@@ -84,12 +84,13 @@
     <p:sldId id="533" r:id="rId75"/>
     <p:sldId id="530" r:id="rId76"/>
     <p:sldId id="534" r:id="rId77"/>
-    <p:sldId id="535" r:id="rId78"/>
-    <p:sldId id="539" r:id="rId79"/>
-    <p:sldId id="536" r:id="rId80"/>
-    <p:sldId id="537" r:id="rId81"/>
-    <p:sldId id="538" r:id="rId82"/>
-    <p:sldId id="529" r:id="rId83"/>
+    <p:sldId id="541" r:id="rId78"/>
+    <p:sldId id="535" r:id="rId79"/>
+    <p:sldId id="539" r:id="rId80"/>
+    <p:sldId id="536" r:id="rId81"/>
+    <p:sldId id="537" r:id="rId82"/>
+    <p:sldId id="538" r:id="rId83"/>
+    <p:sldId id="529" r:id="rId84"/>
   </p:sldIdLst>
   <p:sldSz cx="9144000" cy="5143500" type="screen16x9"/>
   <p:notesSz cx="6858000" cy="9144000"/>
@@ -11730,6 +11731,14 @@
             <a:rPr lang="en-US" b="1" i="1" dirty="0"/>
             <a:t>same page</a:t>
           </a:r>
+        </a:p>
+        <a:p>
+          <a:r>
+            <a:rPr lang="en-US" b="0" i="0" dirty="0"/>
+            <a:t>Or Fd Pointer must be NULL</a:t>
+          </a:r>
+        </a:p>
+        <a:p>
           <a:endParaRPr lang="en-US" dirty="0"/>
         </a:p>
       </dgm:t>
@@ -16800,8 +16809,8 @@
       </dsp:nvSpPr>
       <dsp:spPr>
         <a:xfrm>
-          <a:off x="1180121" y="432079"/>
-          <a:ext cx="1268367" cy="1268367"/>
+          <a:off x="1182819" y="158872"/>
+          <a:ext cx="1267128" cy="1267128"/>
         </a:xfrm>
         <a:prstGeom prst="rect">
           <a:avLst/>
@@ -16850,8 +16859,8 @@
       </dsp:nvSpPr>
       <dsp:spPr>
         <a:xfrm>
-          <a:off x="2351" y="1803618"/>
-          <a:ext cx="3623906" cy="543585"/>
+          <a:off x="6200" y="1552668"/>
+          <a:ext cx="3620367" cy="543055"/>
         </a:xfrm>
         <a:prstGeom prst="rect">
           <a:avLst/>
@@ -16900,8 +16909,8 @@
         </a:p>
       </dsp:txBody>
       <dsp:txXfrm>
-        <a:off x="2351" y="1803618"/>
-        <a:ext cx="3623906" cy="543585"/>
+        <a:off x="6200" y="1552668"/>
+        <a:ext cx="3620367" cy="543055"/>
       </dsp:txXfrm>
     </dsp:sp>
     <dsp:sp modelId="{04660520-9B68-4533-8D4C-EB872D4B1069}">
@@ -16911,8 +16920,8 @@
       </dsp:nvSpPr>
       <dsp:spPr>
         <a:xfrm>
-          <a:off x="2351" y="2395191"/>
-          <a:ext cx="3623906" cy="436232"/>
+          <a:off x="6200" y="2154639"/>
+          <a:ext cx="3620367" cy="949992"/>
         </a:xfrm>
         <a:prstGeom prst="rect">
           <a:avLst/>
@@ -16961,12 +16970,44 @@
             <a:rPr lang="en-US" sz="1400" b="1" i="1" kern="1200" dirty="0"/>
             <a:t>same page</a:t>
           </a:r>
+        </a:p>
+        <a:p>
+          <a:pPr marL="0" lvl="0" indent="0" algn="ctr" defTabSz="622300">
+            <a:lnSpc>
+              <a:spcPct val="90000"/>
+            </a:lnSpc>
+            <a:spcBef>
+              <a:spcPct val="0"/>
+            </a:spcBef>
+            <a:spcAft>
+              <a:spcPct val="35000"/>
+            </a:spcAft>
+            <a:buNone/>
+          </a:pPr>
+          <a:r>
+            <a:rPr lang="en-US" sz="1400" b="0" i="0" kern="1200" dirty="0"/>
+            <a:t>Or Fd Pointer must be NULL</a:t>
+          </a:r>
+        </a:p>
+        <a:p>
+          <a:pPr marL="0" lvl="0" indent="0" algn="ctr" defTabSz="622300">
+            <a:lnSpc>
+              <a:spcPct val="90000"/>
+            </a:lnSpc>
+            <a:spcBef>
+              <a:spcPct val="0"/>
+            </a:spcBef>
+            <a:spcAft>
+              <a:spcPct val="35000"/>
+            </a:spcAft>
+            <a:buNone/>
+          </a:pPr>
           <a:endParaRPr lang="en-US" sz="1400" kern="1200" dirty="0"/>
         </a:p>
       </dsp:txBody>
       <dsp:txXfrm>
-        <a:off x="2351" y="2395191"/>
-        <a:ext cx="3623906" cy="436232"/>
+        <a:off x="6200" y="2154639"/>
+        <a:ext cx="3620367" cy="949992"/>
       </dsp:txXfrm>
     </dsp:sp>
     <dsp:sp modelId="{FAF93089-58BE-4C1A-A700-DDD6578740FE}">
@@ -16976,8 +17017,8 @@
       </dsp:nvSpPr>
       <dsp:spPr>
         <a:xfrm>
-          <a:off x="5438211" y="432079"/>
-          <a:ext cx="1268367" cy="1268367"/>
+          <a:off x="5436751" y="158872"/>
+          <a:ext cx="1267128" cy="1267128"/>
         </a:xfrm>
         <a:prstGeom prst="rect">
           <a:avLst/>
@@ -17026,8 +17067,8 @@
       </dsp:nvSpPr>
       <dsp:spPr>
         <a:xfrm>
-          <a:off x="4260441" y="1803618"/>
-          <a:ext cx="3623906" cy="543585"/>
+          <a:off x="4260132" y="1552668"/>
+          <a:ext cx="3620367" cy="543055"/>
         </a:xfrm>
         <a:prstGeom prst="rect">
           <a:avLst/>
@@ -17084,8 +17125,8 @@
         </a:p>
       </dsp:txBody>
       <dsp:txXfrm>
-        <a:off x="4260441" y="1803618"/>
-        <a:ext cx="3623906" cy="543585"/>
+        <a:off x="4260132" y="1552668"/>
+        <a:ext cx="3620367" cy="543055"/>
       </dsp:txXfrm>
     </dsp:sp>
     <dsp:sp modelId="{1782A48B-88DD-4A76-B942-D5C5717E651A}">
@@ -17095,8 +17136,8 @@
       </dsp:nvSpPr>
       <dsp:spPr>
         <a:xfrm>
-          <a:off x="4260441" y="2395191"/>
-          <a:ext cx="3623906" cy="436232"/>
+          <a:off x="4260132" y="2154639"/>
+          <a:ext cx="3620367" cy="949992"/>
         </a:xfrm>
         <a:prstGeom prst="rect">
           <a:avLst/>
@@ -32002,7 +32043,7 @@
           <a:p>
             <a:fld id="{2DA23E8D-1792-1541-9147-970A8DD8A355}" type="datetimeFigureOut">
               <a:rPr lang="en-US" smtClean="0"/>
-              <a:t>3/27/21</a:t>
+              <a:t>4/21/21</a:t>
             </a:fld>
             <a:endParaRPr lang="en-US" dirty="0"/>
           </a:p>
@@ -32689,6 +32730,90 @@
 </p:notes>
 </file>
 
+<file path=ppt/notesSlides/notesSlide6.xml><?xml version="1.0" encoding="utf-8"?>
+<p:notes xmlns:a="http://schemas.openxmlformats.org/drawingml/2006/main" xmlns:r="http://schemas.openxmlformats.org/officeDocument/2006/relationships" xmlns:p="http://schemas.openxmlformats.org/presentationml/2006/main">
+  <p:cSld>
+    <p:spTree>
+      <p:nvGrpSpPr>
+        <p:cNvPr id="1" name=""/>
+        <p:cNvGrpSpPr/>
+        <p:nvPr/>
+      </p:nvGrpSpPr>
+      <p:grpSpPr>
+        <a:xfrm>
+          <a:off x="0" y="0"/>
+          <a:ext cx="0" cy="0"/>
+          <a:chOff x="0" y="0"/>
+          <a:chExt cx="0" cy="0"/>
+        </a:xfrm>
+      </p:grpSpPr>
+      <p:sp>
+        <p:nvSpPr>
+          <p:cNvPr id="2" name="Slide Image Placeholder 1"/>
+          <p:cNvSpPr>
+            <a:spLocks noGrp="1" noRot="1" noChangeAspect="1"/>
+          </p:cNvSpPr>
+          <p:nvPr>
+            <p:ph type="sldImg"/>
+          </p:nvPr>
+        </p:nvSpPr>
+        <p:spPr/>
+      </p:sp>
+      <p:sp>
+        <p:nvSpPr>
+          <p:cNvPr id="3" name="Notes Placeholder 2"/>
+          <p:cNvSpPr>
+            <a:spLocks noGrp="1"/>
+          </p:cNvSpPr>
+          <p:nvPr>
+            <p:ph type="body" idx="1"/>
+          </p:nvPr>
+        </p:nvSpPr>
+        <p:spPr/>
+        <p:txBody>
+          <a:bodyPr/>
+          <a:lstStyle/>
+          <a:p>
+            <a:endParaRPr lang="en-US" dirty="0"/>
+          </a:p>
+        </p:txBody>
+      </p:sp>
+      <p:sp>
+        <p:nvSpPr>
+          <p:cNvPr id="4" name="Slide Number Placeholder 3"/>
+          <p:cNvSpPr>
+            <a:spLocks noGrp="1"/>
+          </p:cNvSpPr>
+          <p:nvPr>
+            <p:ph type="sldNum" sz="quarter" idx="5"/>
+          </p:nvPr>
+        </p:nvSpPr>
+        <p:spPr/>
+        <p:txBody>
+          <a:bodyPr/>
+          <a:lstStyle/>
+          <a:p>
+            <a:fld id="{AC55928C-CD14-454C-B617-1AFCF9A58596}" type="slidenum">
+              <a:rPr lang="en-US" smtClean="0"/>
+              <a:t>77</a:t>
+            </a:fld>
+            <a:endParaRPr lang="en-US" dirty="0"/>
+          </a:p>
+        </p:txBody>
+      </p:sp>
+    </p:spTree>
+    <p:extLst>
+      <p:ext uri="{BB962C8B-B14F-4D97-AF65-F5344CB8AC3E}">
+        <p14:creationId xmlns:p14="http://schemas.microsoft.com/office/powerpoint/2010/main" val="2333726025"/>
+      </p:ext>
+    </p:extLst>
+  </p:cSld>
+  <p:clrMapOvr>
+    <a:masterClrMapping/>
+  </p:clrMapOvr>
+</p:notes>
+</file>
+
 <file path=ppt/slideLayouts/slideLayout1.xml><?xml version="1.0" encoding="utf-8"?>
 <p:sldLayout xmlns:a="http://schemas.openxmlformats.org/drawingml/2006/main" xmlns:r="http://schemas.openxmlformats.org/officeDocument/2006/relationships" xmlns:p="http://schemas.openxmlformats.org/presentationml/2006/main" type="title" preserve="1">
   <p:cSld name="Title Slide">
@@ -32892,7 +33017,7 @@
                 <a:latin typeface="Calibri"/>
               </a:rPr>
               <a:pPr/>
-              <a:t>3/27/21</a:t>
+              <a:t>4/21/21</a:t>
             </a:fld>
             <a:endParaRPr lang="en-US" dirty="0">
               <a:solidFill>
@@ -33145,7 +33270,7 @@
                 <a:latin typeface="Calibri"/>
               </a:rPr>
               <a:pPr/>
-              <a:t>3/27/21</a:t>
+              <a:t>4/21/21</a:t>
             </a:fld>
             <a:endParaRPr lang="en-US" dirty="0">
               <a:solidFill>
@@ -33360,7 +33485,7 @@
                 <a:latin typeface="Calibri"/>
               </a:rPr>
               <a:pPr/>
-              <a:t>3/27/21</a:t>
+              <a:t>4/21/21</a:t>
             </a:fld>
             <a:endParaRPr lang="en-US" dirty="0">
               <a:solidFill>
@@ -33758,7 +33883,7 @@
                 <a:latin typeface="Calibri"/>
               </a:rPr>
               <a:pPr/>
-              <a:t>3/27/21</a:t>
+              <a:t>4/21/21</a:t>
             </a:fld>
             <a:endParaRPr lang="en-US" dirty="0">
               <a:solidFill>
@@ -34100,7 +34225,7 @@
                 <a:latin typeface="Calibri"/>
               </a:rPr>
               <a:pPr/>
-              <a:t>3/27/21</a:t>
+              <a:t>4/21/21</a:t>
             </a:fld>
             <a:endParaRPr lang="en-US" dirty="0">
               <a:solidFill>
@@ -34428,7 +34553,7 @@
                 <a:latin typeface="Calibri"/>
               </a:rPr>
               <a:pPr/>
-              <a:t>3/27/21</a:t>
+              <a:t>4/21/21</a:t>
             </a:fld>
             <a:endParaRPr lang="en-US" dirty="0">
               <a:solidFill>
@@ -34917,7 +35042,7 @@
                 <a:latin typeface="Calibri"/>
               </a:rPr>
               <a:pPr/>
-              <a:t>3/27/21</a:t>
+              <a:t>4/21/21</a:t>
             </a:fld>
             <a:endParaRPr lang="en-US" dirty="0">
               <a:solidFill>
@@ -35100,7 +35225,7 @@
                 <a:latin typeface="Calibri"/>
               </a:rPr>
               <a:pPr/>
-              <a:t>3/27/21</a:t>
+              <a:t>4/21/21</a:t>
             </a:fld>
             <a:endParaRPr lang="en-US" dirty="0">
               <a:solidFill>
@@ -35346,7 +35471,7 @@
                 <a:latin typeface="Calibri"/>
               </a:rPr>
               <a:pPr/>
-              <a:t>3/27/21</a:t>
+              <a:t>4/21/21</a:t>
             </a:fld>
             <a:endParaRPr lang="en-US" dirty="0">
               <a:solidFill>
@@ -35688,7 +35813,7 @@
                 <a:latin typeface="Calibri"/>
               </a:rPr>
               <a:pPr/>
-              <a:t>3/27/21</a:t>
+              <a:t>4/21/21</a:t>
             </a:fld>
             <a:endParaRPr lang="en-US" dirty="0">
               <a:solidFill>
@@ -35980,7 +36105,7 @@
                 <a:latin typeface="Calibri"/>
               </a:rPr>
               <a:pPr/>
-              <a:t>3/27/21</a:t>
+              <a:t>4/21/21</a:t>
             </a:fld>
             <a:endParaRPr lang="en-US" dirty="0">
               <a:solidFill>
@@ -36230,7 +36355,7 @@
                 <a:latin typeface="Calibri"/>
               </a:rPr>
               <a:pPr defTabSz="914400"/>
-              <a:t>3/27/21</a:t>
+              <a:t>4/21/21</a:t>
             </a:fld>
             <a:endParaRPr lang="en-US" dirty="0">
               <a:solidFill>
@@ -55378,6 +55503,862 @@
       </p:grpSpPr>
       <p:sp>
         <p:nvSpPr>
+          <p:cNvPr id="71" name="Title 1">
+            <a:extLst>
+              <a:ext uri="{FF2B5EF4-FFF2-40B4-BE49-F238E27FC236}">
+                <a16:creationId xmlns:a16="http://schemas.microsoft.com/office/drawing/2014/main" id="{DF5690BF-289F-47F1-A7CF-463D71951913}"/>
+              </a:ext>
+            </a:extLst>
+          </p:cNvPr>
+          <p:cNvSpPr>
+            <a:spLocks noGrp="1"/>
+          </p:cNvSpPr>
+          <p:nvPr>
+            <p:ph type="title"/>
+          </p:nvPr>
+        </p:nvSpPr>
+        <p:spPr>
+          <a:xfrm>
+            <a:off x="208787" y="285697"/>
+            <a:ext cx="9068375" cy="994172"/>
+          </a:xfrm>
+        </p:spPr>
+        <p:txBody>
+          <a:bodyPr>
+            <a:normAutofit fontScale="90000"/>
+          </a:bodyPr>
+          <a:lstStyle/>
+          <a:p>
+            <a:r>
+              <a:rPr lang="en-US" dirty="0"/>
+              <a:t>Decoding via Mangled Pointer Leak – Null </a:t>
+            </a:r>
+          </a:p>
+        </p:txBody>
+      </p:sp>
+      <p:sp>
+        <p:nvSpPr>
+          <p:cNvPr id="4" name="TextBox 3">
+            <a:extLst>
+              <a:ext uri="{FF2B5EF4-FFF2-40B4-BE49-F238E27FC236}">
+                <a16:creationId xmlns:a16="http://schemas.microsoft.com/office/drawing/2014/main" id="{5D9F051C-C6F1-734B-935D-8A727AE265CE}"/>
+              </a:ext>
+            </a:extLst>
+          </p:cNvPr>
+          <p:cNvSpPr txBox="1"/>
+          <p:nvPr/>
+        </p:nvSpPr>
+        <p:spPr>
+          <a:xfrm>
+            <a:off x="208787" y="2651057"/>
+            <a:ext cx="2488557" cy="369332"/>
+          </a:xfrm>
+          <a:prstGeom prst="rect">
+            <a:avLst/>
+          </a:prstGeom>
+          <a:noFill/>
+        </p:spPr>
+        <p:txBody>
+          <a:bodyPr wrap="square" rtlCol="0">
+            <a:spAutoFit/>
+          </a:bodyPr>
+          <a:lstStyle/>
+          <a:p>
+            <a:r>
+              <a:rPr lang="en-US" b="1" dirty="0">
+                <a:solidFill>
+                  <a:schemeClr val="bg2">
+                    <a:lumMod val="50000"/>
+                  </a:schemeClr>
+                </a:solidFill>
+              </a:rPr>
+              <a:t>P (Pointer to </a:t>
+            </a:r>
+            <a:r>
+              <a:rPr lang="en-US" b="1" dirty="0" err="1">
+                <a:solidFill>
+                  <a:schemeClr val="bg2">
+                    <a:lumMod val="50000"/>
+                  </a:schemeClr>
+                </a:solidFill>
+              </a:rPr>
+              <a:t>Unmangle</a:t>
+            </a:r>
+            <a:r>
+              <a:rPr lang="en-US" b="1" dirty="0">
+                <a:solidFill>
+                  <a:schemeClr val="bg2">
+                    <a:lumMod val="50000"/>
+                  </a:schemeClr>
+                </a:solidFill>
+              </a:rPr>
+              <a:t>) </a:t>
+            </a:r>
+          </a:p>
+        </p:txBody>
+      </p:sp>
+      <p:sp>
+        <p:nvSpPr>
+          <p:cNvPr id="7" name="TextBox 6">
+            <a:extLst>
+              <a:ext uri="{FF2B5EF4-FFF2-40B4-BE49-F238E27FC236}">
+                <a16:creationId xmlns:a16="http://schemas.microsoft.com/office/drawing/2014/main" id="{ED904C9F-4C84-2E48-B7EB-33B27FCB24C6}"/>
+              </a:ext>
+            </a:extLst>
+          </p:cNvPr>
+          <p:cNvSpPr txBox="1"/>
+          <p:nvPr/>
+        </p:nvSpPr>
+        <p:spPr>
+          <a:xfrm>
+            <a:off x="231997" y="3210823"/>
+            <a:ext cx="2488557" cy="369332"/>
+          </a:xfrm>
+          <a:prstGeom prst="rect">
+            <a:avLst/>
+          </a:prstGeom>
+          <a:noFill/>
+        </p:spPr>
+        <p:txBody>
+          <a:bodyPr wrap="square" rtlCol="0">
+            <a:spAutoFit/>
+          </a:bodyPr>
+          <a:lstStyle/>
+          <a:p>
+            <a:r>
+              <a:rPr lang="en-US" b="1" dirty="0">
+                <a:solidFill>
+                  <a:schemeClr val="bg2">
+                    <a:lumMod val="50000"/>
+                  </a:schemeClr>
+                </a:solidFill>
+              </a:rPr>
+              <a:t>L (Storage Location)</a:t>
+            </a:r>
+          </a:p>
+        </p:txBody>
+      </p:sp>
+      <p:cxnSp>
+        <p:nvCxnSpPr>
+          <p:cNvPr id="8" name="Straight Connector 7">
+            <a:extLst>
+              <a:ext uri="{FF2B5EF4-FFF2-40B4-BE49-F238E27FC236}">
+                <a16:creationId xmlns:a16="http://schemas.microsoft.com/office/drawing/2014/main" id="{99B4315D-6411-8847-9ED3-EAE9764D3889}"/>
+              </a:ext>
+            </a:extLst>
+          </p:cNvPr>
+          <p:cNvCxnSpPr>
+            <a:cxnSpLocks/>
+          </p:cNvCxnSpPr>
+          <p:nvPr/>
+        </p:nvCxnSpPr>
+        <p:spPr>
+          <a:xfrm>
+            <a:off x="2520175" y="3122341"/>
+            <a:ext cx="2297153" cy="0"/>
+          </a:xfrm>
+          <a:prstGeom prst="line">
+            <a:avLst/>
+          </a:prstGeom>
+          <a:ln w="34925">
+            <a:solidFill>
+              <a:schemeClr val="tx1"/>
+            </a:solidFill>
+          </a:ln>
+        </p:spPr>
+        <p:style>
+          <a:lnRef idx="1">
+            <a:schemeClr val="accent1"/>
+          </a:lnRef>
+          <a:fillRef idx="0">
+            <a:schemeClr val="accent1"/>
+          </a:fillRef>
+          <a:effectRef idx="0">
+            <a:schemeClr val="accent1"/>
+          </a:effectRef>
+          <a:fontRef idx="minor">
+            <a:schemeClr val="tx1"/>
+          </a:fontRef>
+        </p:style>
+      </p:cxnSp>
+      <p:sp>
+        <p:nvSpPr>
+          <p:cNvPr id="9" name="TextBox 8">
+            <a:extLst>
+              <a:ext uri="{FF2B5EF4-FFF2-40B4-BE49-F238E27FC236}">
+                <a16:creationId xmlns:a16="http://schemas.microsoft.com/office/drawing/2014/main" id="{DB41B0FD-A944-FB45-8C47-4165FA36186C}"/>
+              </a:ext>
+            </a:extLst>
+          </p:cNvPr>
+          <p:cNvSpPr txBox="1"/>
+          <p:nvPr/>
+        </p:nvSpPr>
+        <p:spPr>
+          <a:xfrm>
+            <a:off x="2529657" y="2546937"/>
+            <a:ext cx="2754351" cy="584775"/>
+          </a:xfrm>
+          <a:prstGeom prst="rect">
+            <a:avLst/>
+          </a:prstGeom>
+          <a:noFill/>
+        </p:spPr>
+        <p:txBody>
+          <a:bodyPr wrap="square" rtlCol="0">
+            <a:spAutoFit/>
+          </a:bodyPr>
+          <a:lstStyle/>
+          <a:p>
+            <a:r>
+              <a:rPr lang="en-US" sz="3200" dirty="0"/>
+              <a:t>0x000000000</a:t>
+            </a:r>
+          </a:p>
+        </p:txBody>
+      </p:sp>
+      <p:sp>
+        <p:nvSpPr>
+          <p:cNvPr id="10" name="TextBox 9">
+            <a:extLst>
+              <a:ext uri="{FF2B5EF4-FFF2-40B4-BE49-F238E27FC236}">
+                <a16:creationId xmlns:a16="http://schemas.microsoft.com/office/drawing/2014/main" id="{EE77FD63-27BB-7B4A-BF72-43DF84CE3167}"/>
+              </a:ext>
+            </a:extLst>
+          </p:cNvPr>
+          <p:cNvSpPr txBox="1"/>
+          <p:nvPr/>
+        </p:nvSpPr>
+        <p:spPr>
+          <a:xfrm>
+            <a:off x="2198899" y="3106066"/>
+            <a:ext cx="2754351" cy="584775"/>
+          </a:xfrm>
+          <a:prstGeom prst="rect">
+            <a:avLst/>
+          </a:prstGeom>
+          <a:noFill/>
+        </p:spPr>
+        <p:txBody>
+          <a:bodyPr wrap="square" rtlCol="0">
+            <a:spAutoFit/>
+          </a:bodyPr>
+          <a:lstStyle/>
+          <a:p>
+            <a:pPr algn="r"/>
+            <a:r>
+              <a:rPr lang="en-US" sz="3200" dirty="0"/>
+              <a:t>0x000987654</a:t>
+            </a:r>
+          </a:p>
+        </p:txBody>
+      </p:sp>
+      <p:sp>
+        <p:nvSpPr>
+          <p:cNvPr id="11" name="TextBox 10">
+            <a:extLst>
+              <a:ext uri="{FF2B5EF4-FFF2-40B4-BE49-F238E27FC236}">
+                <a16:creationId xmlns:a16="http://schemas.microsoft.com/office/drawing/2014/main" id="{9C544459-F090-9C46-9A39-0768AF7EADB3}"/>
+              </a:ext>
+            </a:extLst>
+          </p:cNvPr>
+          <p:cNvSpPr txBox="1"/>
+          <p:nvPr/>
+        </p:nvSpPr>
+        <p:spPr>
+          <a:xfrm>
+            <a:off x="1722738" y="2829953"/>
+            <a:ext cx="952322" cy="584775"/>
+          </a:xfrm>
+          <a:prstGeom prst="rect">
+            <a:avLst/>
+          </a:prstGeom>
+          <a:noFill/>
+        </p:spPr>
+        <p:txBody>
+          <a:bodyPr wrap="square" rtlCol="0">
+            <a:spAutoFit/>
+          </a:bodyPr>
+          <a:lstStyle/>
+          <a:p>
+            <a:r>
+              <a:rPr lang="en-US" sz="3200" dirty="0"/>
+              <a:t>XOR</a:t>
+            </a:r>
+          </a:p>
+        </p:txBody>
+      </p:sp>
+      <p:sp>
+        <p:nvSpPr>
+          <p:cNvPr id="12" name="TextBox 11">
+            <a:extLst>
+              <a:ext uri="{FF2B5EF4-FFF2-40B4-BE49-F238E27FC236}">
+                <a16:creationId xmlns:a16="http://schemas.microsoft.com/office/drawing/2014/main" id="{64A51502-035F-5643-A34B-8F3515C23174}"/>
+              </a:ext>
+            </a:extLst>
+          </p:cNvPr>
+          <p:cNvSpPr txBox="1"/>
+          <p:nvPr/>
+        </p:nvSpPr>
+        <p:spPr>
+          <a:xfrm>
+            <a:off x="4817328" y="2811802"/>
+            <a:ext cx="3192352" cy="1569660"/>
+          </a:xfrm>
+          <a:prstGeom prst="rect">
+            <a:avLst/>
+          </a:prstGeom>
+          <a:noFill/>
+        </p:spPr>
+        <p:txBody>
+          <a:bodyPr wrap="square" rtlCol="0">
+            <a:spAutoFit/>
+          </a:bodyPr>
+          <a:lstStyle/>
+          <a:p>
+            <a:r>
+              <a:rPr lang="en-US" sz="3200" dirty="0"/>
+              <a:t> = 0x000987654</a:t>
+            </a:r>
+          </a:p>
+          <a:p>
+            <a:endParaRPr lang="en-US" sz="3200" dirty="0"/>
+          </a:p>
+          <a:p>
+            <a:endParaRPr lang="en-US" sz="3200" dirty="0"/>
+          </a:p>
+        </p:txBody>
+      </p:sp>
+      <p:cxnSp>
+        <p:nvCxnSpPr>
+          <p:cNvPr id="16" name="Straight Connector 15">
+            <a:extLst>
+              <a:ext uri="{FF2B5EF4-FFF2-40B4-BE49-F238E27FC236}">
+                <a16:creationId xmlns:a16="http://schemas.microsoft.com/office/drawing/2014/main" id="{55F0AF83-2A6F-C644-A025-5CD49B79D88A}"/>
+              </a:ext>
+            </a:extLst>
+          </p:cNvPr>
+          <p:cNvCxnSpPr>
+            <a:cxnSpLocks/>
+          </p:cNvCxnSpPr>
+          <p:nvPr/>
+        </p:nvCxnSpPr>
+        <p:spPr>
+          <a:xfrm>
+            <a:off x="2996336" y="3014030"/>
+            <a:ext cx="579738" cy="0"/>
+          </a:xfrm>
+          <a:prstGeom prst="line">
+            <a:avLst/>
+          </a:prstGeom>
+          <a:ln w="38100"/>
+        </p:spPr>
+        <p:style>
+          <a:lnRef idx="1">
+            <a:schemeClr val="accent1"/>
+          </a:lnRef>
+          <a:fillRef idx="0">
+            <a:schemeClr val="accent1"/>
+          </a:fillRef>
+          <a:effectRef idx="0">
+            <a:schemeClr val="accent1"/>
+          </a:effectRef>
+          <a:fontRef idx="minor">
+            <a:schemeClr val="tx1"/>
+          </a:fontRef>
+        </p:style>
+      </p:cxnSp>
+      <p:cxnSp>
+        <p:nvCxnSpPr>
+          <p:cNvPr id="17" name="Straight Connector 16">
+            <a:extLst>
+              <a:ext uri="{FF2B5EF4-FFF2-40B4-BE49-F238E27FC236}">
+                <a16:creationId xmlns:a16="http://schemas.microsoft.com/office/drawing/2014/main" id="{1E578C33-84AC-D948-840B-BA2423CC2AC2}"/>
+              </a:ext>
+            </a:extLst>
+          </p:cNvPr>
+          <p:cNvCxnSpPr>
+            <a:cxnSpLocks/>
+          </p:cNvCxnSpPr>
+          <p:nvPr/>
+        </p:nvCxnSpPr>
+        <p:spPr>
+          <a:xfrm>
+            <a:off x="3637166" y="3627943"/>
+            <a:ext cx="579738" cy="0"/>
+          </a:xfrm>
+          <a:prstGeom prst="line">
+            <a:avLst/>
+          </a:prstGeom>
+          <a:ln w="38100"/>
+        </p:spPr>
+        <p:style>
+          <a:lnRef idx="1">
+            <a:schemeClr val="accent1"/>
+          </a:lnRef>
+          <a:fillRef idx="0">
+            <a:schemeClr val="accent1"/>
+          </a:fillRef>
+          <a:effectRef idx="0">
+            <a:schemeClr val="accent1"/>
+          </a:effectRef>
+          <a:fontRef idx="minor">
+            <a:schemeClr val="tx1"/>
+          </a:fontRef>
+        </p:style>
+      </p:cxnSp>
+      <p:cxnSp>
+        <p:nvCxnSpPr>
+          <p:cNvPr id="19" name="Straight Connector 18">
+            <a:extLst>
+              <a:ext uri="{FF2B5EF4-FFF2-40B4-BE49-F238E27FC236}">
+                <a16:creationId xmlns:a16="http://schemas.microsoft.com/office/drawing/2014/main" id="{864B4970-8BDE-6A45-BC7C-05EDFDB5BFA6}"/>
+              </a:ext>
+            </a:extLst>
+          </p:cNvPr>
+          <p:cNvCxnSpPr>
+            <a:cxnSpLocks/>
+          </p:cNvCxnSpPr>
+          <p:nvPr/>
+        </p:nvCxnSpPr>
+        <p:spPr>
+          <a:xfrm>
+            <a:off x="3617424" y="2309695"/>
+            <a:ext cx="0" cy="1570327"/>
+          </a:xfrm>
+          <a:prstGeom prst="line">
+            <a:avLst/>
+          </a:prstGeom>
+          <a:ln>
+            <a:solidFill>
+              <a:srgbClr val="FF0000"/>
+            </a:solidFill>
+          </a:ln>
+        </p:spPr>
+        <p:style>
+          <a:lnRef idx="1">
+            <a:schemeClr val="accent1"/>
+          </a:lnRef>
+          <a:fillRef idx="0">
+            <a:schemeClr val="accent1"/>
+          </a:fillRef>
+          <a:effectRef idx="0">
+            <a:schemeClr val="accent1"/>
+          </a:effectRef>
+          <a:fontRef idx="minor">
+            <a:schemeClr val="tx1"/>
+          </a:fontRef>
+        </p:style>
+      </p:cxnSp>
+      <p:cxnSp>
+        <p:nvCxnSpPr>
+          <p:cNvPr id="20" name="Straight Connector 19">
+            <a:extLst>
+              <a:ext uri="{FF2B5EF4-FFF2-40B4-BE49-F238E27FC236}">
+                <a16:creationId xmlns:a16="http://schemas.microsoft.com/office/drawing/2014/main" id="{E275B8B8-7CE8-8149-B839-8BF6964683D9}"/>
+              </a:ext>
+            </a:extLst>
+          </p:cNvPr>
+          <p:cNvCxnSpPr>
+            <a:cxnSpLocks/>
+          </p:cNvCxnSpPr>
+          <p:nvPr/>
+        </p:nvCxnSpPr>
+        <p:spPr>
+          <a:xfrm>
+            <a:off x="4233524" y="2309693"/>
+            <a:ext cx="0" cy="1570327"/>
+          </a:xfrm>
+          <a:prstGeom prst="line">
+            <a:avLst/>
+          </a:prstGeom>
+          <a:ln>
+            <a:solidFill>
+              <a:srgbClr val="FF0000"/>
+            </a:solidFill>
+          </a:ln>
+        </p:spPr>
+        <p:style>
+          <a:lnRef idx="1">
+            <a:schemeClr val="accent1"/>
+          </a:lnRef>
+          <a:fillRef idx="0">
+            <a:schemeClr val="accent1"/>
+          </a:fillRef>
+          <a:effectRef idx="0">
+            <a:schemeClr val="accent1"/>
+          </a:effectRef>
+          <a:fontRef idx="minor">
+            <a:schemeClr val="tx1"/>
+          </a:fontRef>
+        </p:style>
+      </p:cxnSp>
+      <p:cxnSp>
+        <p:nvCxnSpPr>
+          <p:cNvPr id="21" name="Straight Connector 20">
+            <a:extLst>
+              <a:ext uri="{FF2B5EF4-FFF2-40B4-BE49-F238E27FC236}">
+                <a16:creationId xmlns:a16="http://schemas.microsoft.com/office/drawing/2014/main" id="{F4CCE0AA-E10B-EE4A-8E90-7857CA543BDE}"/>
+              </a:ext>
+            </a:extLst>
+          </p:cNvPr>
+          <p:cNvCxnSpPr>
+            <a:cxnSpLocks/>
+          </p:cNvCxnSpPr>
+          <p:nvPr/>
+        </p:nvCxnSpPr>
+        <p:spPr>
+          <a:xfrm>
+            <a:off x="2996336" y="2309693"/>
+            <a:ext cx="0" cy="1570327"/>
+          </a:xfrm>
+          <a:prstGeom prst="line">
+            <a:avLst/>
+          </a:prstGeom>
+          <a:ln>
+            <a:solidFill>
+              <a:srgbClr val="FF0000"/>
+            </a:solidFill>
+          </a:ln>
+        </p:spPr>
+        <p:style>
+          <a:lnRef idx="1">
+            <a:schemeClr val="accent1"/>
+          </a:lnRef>
+          <a:fillRef idx="0">
+            <a:schemeClr val="accent1"/>
+          </a:fillRef>
+          <a:effectRef idx="0">
+            <a:schemeClr val="accent1"/>
+          </a:effectRef>
+          <a:fontRef idx="minor">
+            <a:schemeClr val="tx1"/>
+          </a:fontRef>
+        </p:style>
+      </p:cxnSp>
+      <p:cxnSp>
+        <p:nvCxnSpPr>
+          <p:cNvPr id="22" name="Straight Connector 21">
+            <a:extLst>
+              <a:ext uri="{FF2B5EF4-FFF2-40B4-BE49-F238E27FC236}">
+                <a16:creationId xmlns:a16="http://schemas.microsoft.com/office/drawing/2014/main" id="{89FBC80B-5C0F-7A42-83AD-B9E7AA95AE7E}"/>
+              </a:ext>
+            </a:extLst>
+          </p:cNvPr>
+          <p:cNvCxnSpPr>
+            <a:cxnSpLocks/>
+          </p:cNvCxnSpPr>
+          <p:nvPr/>
+        </p:nvCxnSpPr>
+        <p:spPr>
+          <a:xfrm>
+            <a:off x="4951013" y="2309694"/>
+            <a:ext cx="0" cy="1570327"/>
+          </a:xfrm>
+          <a:prstGeom prst="line">
+            <a:avLst/>
+          </a:prstGeom>
+          <a:ln>
+            <a:solidFill>
+              <a:srgbClr val="FF0000"/>
+            </a:solidFill>
+          </a:ln>
+        </p:spPr>
+        <p:style>
+          <a:lnRef idx="1">
+            <a:schemeClr val="accent1"/>
+          </a:lnRef>
+          <a:fillRef idx="0">
+            <a:schemeClr val="accent1"/>
+          </a:fillRef>
+          <a:effectRef idx="0">
+            <a:schemeClr val="accent1"/>
+          </a:effectRef>
+          <a:fontRef idx="minor">
+            <a:schemeClr val="tx1"/>
+          </a:fontRef>
+        </p:style>
+      </p:cxnSp>
+      <p:sp>
+        <p:nvSpPr>
+          <p:cNvPr id="23" name="TextBox 22">
+            <a:extLst>
+              <a:ext uri="{FF2B5EF4-FFF2-40B4-BE49-F238E27FC236}">
+                <a16:creationId xmlns:a16="http://schemas.microsoft.com/office/drawing/2014/main" id="{F65EB2E8-B71B-1741-BBBC-EA9AF347C86F}"/>
+              </a:ext>
+            </a:extLst>
+          </p:cNvPr>
+          <p:cNvSpPr txBox="1"/>
+          <p:nvPr/>
+        </p:nvSpPr>
+        <p:spPr>
+          <a:xfrm>
+            <a:off x="2999076" y="2255938"/>
+            <a:ext cx="650645" cy="369332"/>
+          </a:xfrm>
+          <a:prstGeom prst="rect">
+            <a:avLst/>
+          </a:prstGeom>
+          <a:noFill/>
+          <a:ln>
+            <a:noFill/>
+          </a:ln>
+        </p:spPr>
+        <p:txBody>
+          <a:bodyPr wrap="square" rtlCol="0">
+            <a:spAutoFit/>
+          </a:bodyPr>
+          <a:lstStyle/>
+          <a:p>
+            <a:r>
+              <a:rPr lang="en-US" dirty="0"/>
+              <a:t>Set 1</a:t>
+            </a:r>
+          </a:p>
+        </p:txBody>
+      </p:sp>
+      <p:sp>
+        <p:nvSpPr>
+          <p:cNvPr id="24" name="TextBox 23">
+            <a:extLst>
+              <a:ext uri="{FF2B5EF4-FFF2-40B4-BE49-F238E27FC236}">
+                <a16:creationId xmlns:a16="http://schemas.microsoft.com/office/drawing/2014/main" id="{DA6B0663-4401-E547-855C-90E0DC527F02}"/>
+              </a:ext>
+            </a:extLst>
+          </p:cNvPr>
+          <p:cNvSpPr txBox="1"/>
+          <p:nvPr/>
+        </p:nvSpPr>
+        <p:spPr>
+          <a:xfrm>
+            <a:off x="3613378" y="2263330"/>
+            <a:ext cx="650645" cy="369332"/>
+          </a:xfrm>
+          <a:prstGeom prst="rect">
+            <a:avLst/>
+          </a:prstGeom>
+          <a:noFill/>
+          <a:ln>
+            <a:noFill/>
+          </a:ln>
+        </p:spPr>
+        <p:txBody>
+          <a:bodyPr wrap="square" rtlCol="0">
+            <a:spAutoFit/>
+          </a:bodyPr>
+          <a:lstStyle/>
+          <a:p>
+            <a:r>
+              <a:rPr lang="en-US" dirty="0"/>
+              <a:t>Set 2</a:t>
+            </a:r>
+          </a:p>
+        </p:txBody>
+      </p:sp>
+      <p:sp>
+        <p:nvSpPr>
+          <p:cNvPr id="25" name="TextBox 24">
+            <a:extLst>
+              <a:ext uri="{FF2B5EF4-FFF2-40B4-BE49-F238E27FC236}">
+                <a16:creationId xmlns:a16="http://schemas.microsoft.com/office/drawing/2014/main" id="{2D6A6741-BF62-7745-88F9-AD83B082640D}"/>
+              </a:ext>
+            </a:extLst>
+          </p:cNvPr>
+          <p:cNvSpPr txBox="1"/>
+          <p:nvPr/>
+        </p:nvSpPr>
+        <p:spPr>
+          <a:xfrm>
+            <a:off x="4297030" y="2255938"/>
+            <a:ext cx="650645" cy="369332"/>
+          </a:xfrm>
+          <a:prstGeom prst="rect">
+            <a:avLst/>
+          </a:prstGeom>
+          <a:noFill/>
+          <a:ln>
+            <a:noFill/>
+          </a:ln>
+        </p:spPr>
+        <p:txBody>
+          <a:bodyPr wrap="square" rtlCol="0">
+            <a:spAutoFit/>
+          </a:bodyPr>
+          <a:lstStyle/>
+          <a:p>
+            <a:r>
+              <a:rPr lang="en-US" dirty="0"/>
+              <a:t>Set 3</a:t>
+            </a:r>
+          </a:p>
+        </p:txBody>
+      </p:sp>
+      <p:sp>
+        <p:nvSpPr>
+          <p:cNvPr id="26" name="TextBox 25">
+            <a:extLst>
+              <a:ext uri="{FF2B5EF4-FFF2-40B4-BE49-F238E27FC236}">
+                <a16:creationId xmlns:a16="http://schemas.microsoft.com/office/drawing/2014/main" id="{B897A530-1FDB-534E-9C12-09917E082637}"/>
+              </a:ext>
+            </a:extLst>
+          </p:cNvPr>
+          <p:cNvSpPr txBox="1"/>
+          <p:nvPr/>
+        </p:nvSpPr>
+        <p:spPr>
+          <a:xfrm>
+            <a:off x="5194273" y="2226649"/>
+            <a:ext cx="3238136" cy="369332"/>
+          </a:xfrm>
+          <a:prstGeom prst="rect">
+            <a:avLst/>
+          </a:prstGeom>
+          <a:solidFill>
+            <a:schemeClr val="bg1"/>
+          </a:solidFill>
+          <a:ln>
+            <a:solidFill>
+              <a:schemeClr val="accent1"/>
+            </a:solidFill>
+          </a:ln>
+        </p:spPr>
+        <p:txBody>
+          <a:bodyPr wrap="square" rtlCol="0">
+            <a:spAutoFit/>
+          </a:bodyPr>
+          <a:lstStyle/>
+          <a:p>
+            <a:r>
+              <a:rPr lang="en-US" dirty="0"/>
+              <a:t>Heap Base!</a:t>
+            </a:r>
+          </a:p>
+        </p:txBody>
+      </p:sp>
+      <p:cxnSp>
+        <p:nvCxnSpPr>
+          <p:cNvPr id="27" name="Straight Arrow Connector 26">
+            <a:extLst>
+              <a:ext uri="{FF2B5EF4-FFF2-40B4-BE49-F238E27FC236}">
+                <a16:creationId xmlns:a16="http://schemas.microsoft.com/office/drawing/2014/main" id="{2D5F19F5-17B0-6746-AED4-EB9168667D5B}"/>
+              </a:ext>
+            </a:extLst>
+          </p:cNvPr>
+          <p:cNvCxnSpPr>
+            <a:cxnSpLocks/>
+          </p:cNvCxnSpPr>
+          <p:nvPr/>
+        </p:nvCxnSpPr>
+        <p:spPr>
+          <a:xfrm>
+            <a:off x="5634202" y="2595981"/>
+            <a:ext cx="546808" cy="294265"/>
+          </a:xfrm>
+          <a:prstGeom prst="straightConnector1">
+            <a:avLst/>
+          </a:prstGeom>
+          <a:ln>
+            <a:tailEnd type="triangle"/>
+          </a:ln>
+        </p:spPr>
+        <p:style>
+          <a:lnRef idx="1">
+            <a:schemeClr val="accent1"/>
+          </a:lnRef>
+          <a:fillRef idx="0">
+            <a:schemeClr val="accent1"/>
+          </a:fillRef>
+          <a:effectRef idx="0">
+            <a:schemeClr val="accent1"/>
+          </a:effectRef>
+          <a:fontRef idx="minor">
+            <a:schemeClr val="tx1"/>
+          </a:fontRef>
+        </p:style>
+      </p:cxnSp>
+      <p:sp>
+        <p:nvSpPr>
+          <p:cNvPr id="28" name="Content Placeholder 2">
+            <a:extLst>
+              <a:ext uri="{FF2B5EF4-FFF2-40B4-BE49-F238E27FC236}">
+                <a16:creationId xmlns:a16="http://schemas.microsoft.com/office/drawing/2014/main" id="{E942E4D3-DB84-4B4F-85E7-D328F82CED27}"/>
+              </a:ext>
+            </a:extLst>
+          </p:cNvPr>
+          <p:cNvSpPr>
+            <a:spLocks noGrp="1"/>
+          </p:cNvSpPr>
+          <p:nvPr>
+            <p:ph sz="half" idx="1"/>
+          </p:nvPr>
+        </p:nvSpPr>
+        <p:spPr>
+          <a:xfrm>
+            <a:off x="628650" y="1369219"/>
+            <a:ext cx="7797720" cy="3263504"/>
+          </a:xfrm>
+        </p:spPr>
+        <p:txBody>
+          <a:bodyPr>
+            <a:normAutofit/>
+          </a:bodyPr>
+          <a:lstStyle/>
+          <a:p>
+            <a:r>
+              <a:rPr lang="en-US" dirty="0"/>
+              <a:t>What if the ‘fd’ pointer is NULL?</a:t>
+            </a:r>
+          </a:p>
+          <a:p>
+            <a:r>
+              <a:rPr lang="en-US" dirty="0"/>
+              <a:t>Heap Base </a:t>
+            </a:r>
+            <a:r>
+              <a:rPr lang="en-US"/>
+              <a:t>leak for free </a:t>
+            </a:r>
+            <a:r>
+              <a:rPr lang="en-US">
+                <a:sym typeface="Wingdings" pitchFamily="2" charset="2"/>
+              </a:rPr>
+              <a:t> </a:t>
+            </a:r>
+            <a:endParaRPr lang="en-US" dirty="0"/>
+          </a:p>
+        </p:txBody>
+      </p:sp>
+    </p:spTree>
+    <p:extLst>
+      <p:ext uri="{BB962C8B-B14F-4D97-AF65-F5344CB8AC3E}">
+        <p14:creationId xmlns:p14="http://schemas.microsoft.com/office/powerpoint/2010/main" val="3383089323"/>
+      </p:ext>
+    </p:extLst>
+  </p:cSld>
+  <p:clrMapOvr>
+    <a:masterClrMapping/>
+  </p:clrMapOvr>
+</p:sld>
+</file>
+
+<file path=ppt/slides/slide78.xml><?xml version="1.0" encoding="utf-8"?>
+<p:sld xmlns:a="http://schemas.openxmlformats.org/drawingml/2006/main" xmlns:r="http://schemas.openxmlformats.org/officeDocument/2006/relationships" xmlns:p="http://schemas.openxmlformats.org/presentationml/2006/main">
+  <p:cSld>
+    <p:spTree>
+      <p:nvGrpSpPr>
+        <p:cNvPr id="1" name=""/>
+        <p:cNvGrpSpPr/>
+        <p:nvPr/>
+      </p:nvGrpSpPr>
+      <p:grpSpPr>
+        <a:xfrm>
+          <a:off x="0" y="0"/>
+          <a:ext cx="0" cy="0"/>
+          <a:chOff x="0" y="0"/>
+          <a:chExt cx="0" cy="0"/>
+        </a:xfrm>
+      </p:grpSpPr>
+      <p:sp>
+        <p:nvSpPr>
           <p:cNvPr id="2" name="Title 1">
             <a:extLst>
               <a:ext uri="{FF2B5EF4-FFF2-40B4-BE49-F238E27FC236}">
@@ -55427,7 +56408,7 @@
             <p:ph idx="1"/>
             <p:extLst>
               <p:ext uri="{D42A27DB-BD31-4B8C-83A1-F6EECF244321}">
-                <p14:modId xmlns:p14="http://schemas.microsoft.com/office/powerpoint/2010/main" val="1001311639"/>
+                <p14:modId xmlns:p14="http://schemas.microsoft.com/office/powerpoint/2010/main" val="1326297340"/>
               </p:ext>
             </p:extLst>
           </p:nvPr>
@@ -55455,7 +56436,7 @@
 </p:sld>
 </file>
 
-<file path=ppt/slides/slide78.xml><?xml version="1.0" encoding="utf-8"?>
+<file path=ppt/slides/slide79.xml><?xml version="1.0" encoding="utf-8"?>
 <p:sld xmlns:a="http://schemas.openxmlformats.org/drawingml/2006/main" xmlns:r="http://schemas.openxmlformats.org/officeDocument/2006/relationships" xmlns:p="http://schemas.openxmlformats.org/presentationml/2006/main">
   <p:cSld>
     <p:spTree>
@@ -55542,102 +56523,6 @@
     <p:extLst>
       <p:ext uri="{BB962C8B-B14F-4D97-AF65-F5344CB8AC3E}">
         <p14:creationId xmlns:p14="http://schemas.microsoft.com/office/powerpoint/2010/main" val="3252936194"/>
-      </p:ext>
-    </p:extLst>
-  </p:cSld>
-  <p:clrMapOvr>
-    <a:masterClrMapping/>
-  </p:clrMapOvr>
-</p:sld>
-</file>
-
-<file path=ppt/slides/slide79.xml><?xml version="1.0" encoding="utf-8"?>
-<p:sld xmlns:a="http://schemas.openxmlformats.org/drawingml/2006/main" xmlns:r="http://schemas.openxmlformats.org/officeDocument/2006/relationships" xmlns:p="http://schemas.openxmlformats.org/presentationml/2006/main">
-  <p:cSld>
-    <p:spTree>
-      <p:nvGrpSpPr>
-        <p:cNvPr id="1" name=""/>
-        <p:cNvGrpSpPr/>
-        <p:nvPr/>
-      </p:nvGrpSpPr>
-      <p:grpSpPr>
-        <a:xfrm>
-          <a:off x="0" y="0"/>
-          <a:ext cx="0" cy="0"/>
-          <a:chOff x="0" y="0"/>
-          <a:chExt cx="0" cy="0"/>
-        </a:xfrm>
-      </p:grpSpPr>
-      <p:sp>
-        <p:nvSpPr>
-          <p:cNvPr id="2" name="Title 1">
-            <a:extLst>
-              <a:ext uri="{FF2B5EF4-FFF2-40B4-BE49-F238E27FC236}">
-                <a16:creationId xmlns:a16="http://schemas.microsoft.com/office/drawing/2014/main" id="{A8D1A044-C0AD-E646-BFE8-52A12343E5F6}"/>
-              </a:ext>
-            </a:extLst>
-          </p:cNvPr>
-          <p:cNvSpPr>
-            <a:spLocks noGrp="1"/>
-          </p:cNvSpPr>
-          <p:nvPr>
-            <p:ph type="title"/>
-          </p:nvPr>
-        </p:nvSpPr>
-        <p:spPr>
-          <a:xfrm>
-            <a:off x="628650" y="273847"/>
-            <a:ext cx="7886700" cy="994172"/>
-          </a:xfrm>
-        </p:spPr>
-        <p:txBody>
-          <a:bodyPr anchor="ctr">
-            <a:normAutofit/>
-          </a:bodyPr>
-          <a:lstStyle/>
-          <a:p>
-            <a:r>
-              <a:rPr lang="en-US" dirty="0"/>
-              <a:t>Mangling In Practice</a:t>
-            </a:r>
-          </a:p>
-        </p:txBody>
-      </p:sp>
-      <p:graphicFrame>
-        <p:nvGraphicFramePr>
-          <p:cNvPr id="5" name="Content Placeholder 2">
-            <a:extLst>
-              <a:ext uri="{FF2B5EF4-FFF2-40B4-BE49-F238E27FC236}">
-                <a16:creationId xmlns:a16="http://schemas.microsoft.com/office/drawing/2014/main" id="{AD9BF0C8-19FF-42DA-B311-4F0A17FBEAE4}"/>
-              </a:ext>
-            </a:extLst>
-          </p:cNvPr>
-          <p:cNvGraphicFramePr>
-            <a:graphicFrameLocks noGrp="1"/>
-          </p:cNvGraphicFramePr>
-          <p:nvPr>
-            <p:ph idx="1"/>
-            <p:extLst>
-              <p:ext uri="{D42A27DB-BD31-4B8C-83A1-F6EECF244321}">
-                <p14:modId xmlns:p14="http://schemas.microsoft.com/office/powerpoint/2010/main" val="389904848"/>
-              </p:ext>
-            </p:extLst>
-          </p:nvPr>
-        </p:nvGraphicFramePr>
-        <p:xfrm>
-          <a:off x="628650" y="1236541"/>
-          <a:ext cx="7886700" cy="3263504"/>
-        </p:xfrm>
-        <a:graphic>
-          <a:graphicData uri="http://schemas.openxmlformats.org/drawingml/2006/diagram">
-            <dgm:relIds xmlns:dgm="http://schemas.openxmlformats.org/drawingml/2006/diagram" xmlns:r="http://schemas.openxmlformats.org/officeDocument/2006/relationships" r:dm="rId2" r:lo="rId3" r:qs="rId4" r:cs="rId5"/>
-          </a:graphicData>
-        </a:graphic>
-      </p:graphicFrame>
-    </p:spTree>
-    <p:extLst>
-      <p:ext uri="{BB962C8B-B14F-4D97-AF65-F5344CB8AC3E}">
-        <p14:creationId xmlns:p14="http://schemas.microsoft.com/office/powerpoint/2010/main" val="4004216154"/>
       </p:ext>
     </p:extLst>
   </p:cSld>
@@ -55899,6 +56784,102 @@
           <p:cNvPr id="2" name="Title 1">
             <a:extLst>
               <a:ext uri="{FF2B5EF4-FFF2-40B4-BE49-F238E27FC236}">
+                <a16:creationId xmlns:a16="http://schemas.microsoft.com/office/drawing/2014/main" id="{A8D1A044-C0AD-E646-BFE8-52A12343E5F6}"/>
+              </a:ext>
+            </a:extLst>
+          </p:cNvPr>
+          <p:cNvSpPr>
+            <a:spLocks noGrp="1"/>
+          </p:cNvSpPr>
+          <p:nvPr>
+            <p:ph type="title"/>
+          </p:nvPr>
+        </p:nvSpPr>
+        <p:spPr>
+          <a:xfrm>
+            <a:off x="628650" y="273847"/>
+            <a:ext cx="7886700" cy="994172"/>
+          </a:xfrm>
+        </p:spPr>
+        <p:txBody>
+          <a:bodyPr anchor="ctr">
+            <a:normAutofit/>
+          </a:bodyPr>
+          <a:lstStyle/>
+          <a:p>
+            <a:r>
+              <a:rPr lang="en-US" dirty="0"/>
+              <a:t>Mangling In Practice</a:t>
+            </a:r>
+          </a:p>
+        </p:txBody>
+      </p:sp>
+      <p:graphicFrame>
+        <p:nvGraphicFramePr>
+          <p:cNvPr id="5" name="Content Placeholder 2">
+            <a:extLst>
+              <a:ext uri="{FF2B5EF4-FFF2-40B4-BE49-F238E27FC236}">
+                <a16:creationId xmlns:a16="http://schemas.microsoft.com/office/drawing/2014/main" id="{AD9BF0C8-19FF-42DA-B311-4F0A17FBEAE4}"/>
+              </a:ext>
+            </a:extLst>
+          </p:cNvPr>
+          <p:cNvGraphicFramePr>
+            <a:graphicFrameLocks noGrp="1"/>
+          </p:cNvGraphicFramePr>
+          <p:nvPr>
+            <p:ph idx="1"/>
+            <p:extLst>
+              <p:ext uri="{D42A27DB-BD31-4B8C-83A1-F6EECF244321}">
+                <p14:modId xmlns:p14="http://schemas.microsoft.com/office/powerpoint/2010/main" val="389904848"/>
+              </p:ext>
+            </p:extLst>
+          </p:nvPr>
+        </p:nvGraphicFramePr>
+        <p:xfrm>
+          <a:off x="628650" y="1236541"/>
+          <a:ext cx="7886700" cy="3263504"/>
+        </p:xfrm>
+        <a:graphic>
+          <a:graphicData uri="http://schemas.openxmlformats.org/drawingml/2006/diagram">
+            <dgm:relIds xmlns:dgm="http://schemas.openxmlformats.org/drawingml/2006/diagram" xmlns:r="http://schemas.openxmlformats.org/officeDocument/2006/relationships" r:dm="rId2" r:lo="rId3" r:qs="rId4" r:cs="rId5"/>
+          </a:graphicData>
+        </a:graphic>
+      </p:graphicFrame>
+    </p:spTree>
+    <p:extLst>
+      <p:ext uri="{BB962C8B-B14F-4D97-AF65-F5344CB8AC3E}">
+        <p14:creationId xmlns:p14="http://schemas.microsoft.com/office/powerpoint/2010/main" val="4004216154"/>
+      </p:ext>
+    </p:extLst>
+  </p:cSld>
+  <p:clrMapOvr>
+    <a:masterClrMapping/>
+  </p:clrMapOvr>
+</p:sld>
+</file>
+
+<file path=ppt/slides/slide81.xml><?xml version="1.0" encoding="utf-8"?>
+<p:sld xmlns:a="http://schemas.openxmlformats.org/drawingml/2006/main" xmlns:r="http://schemas.openxmlformats.org/officeDocument/2006/relationships" xmlns:p="http://schemas.openxmlformats.org/presentationml/2006/main">
+  <p:cSld>
+    <p:spTree>
+      <p:nvGrpSpPr>
+        <p:cNvPr id="1" name=""/>
+        <p:cNvGrpSpPr/>
+        <p:nvPr/>
+      </p:nvGrpSpPr>
+      <p:grpSpPr>
+        <a:xfrm>
+          <a:off x="0" y="0"/>
+          <a:ext cx="0" cy="0"/>
+          <a:chOff x="0" y="0"/>
+          <a:chExt cx="0" cy="0"/>
+        </a:xfrm>
+      </p:grpSpPr>
+      <p:sp>
+        <p:nvSpPr>
+          <p:cNvPr id="2" name="Title 1">
+            <a:extLst>
+              <a:ext uri="{FF2B5EF4-FFF2-40B4-BE49-F238E27FC236}">
                 <a16:creationId xmlns:a16="http://schemas.microsoft.com/office/drawing/2014/main" id="{7A792517-8D65-884E-9726-F3DE3A6B45AE}"/>
               </a:ext>
             </a:extLst>
@@ -55973,7 +56954,7 @@
 </p:sld>
 </file>
 
-<file path=ppt/slides/slide81.xml><?xml version="1.0" encoding="utf-8"?>
+<file path=ppt/slides/slide82.xml><?xml version="1.0" encoding="utf-8"?>
 <p:sld xmlns:a="http://schemas.openxmlformats.org/drawingml/2006/main" xmlns:r="http://schemas.openxmlformats.org/officeDocument/2006/relationships" xmlns:p="http://schemas.openxmlformats.org/presentationml/2006/main">
   <p:cSld>
     <p:spTree>
@@ -56066,7 +57047,7 @@
 </p:sld>
 </file>
 
-<file path=ppt/slides/slide82.xml><?xml version="1.0" encoding="utf-8"?>
+<file path=ppt/slides/slide83.xml><?xml version="1.0" encoding="utf-8"?>
 <p:sld xmlns:a="http://schemas.openxmlformats.org/drawingml/2006/main" xmlns:r="http://schemas.openxmlformats.org/officeDocument/2006/relationships" xmlns:p="http://schemas.openxmlformats.org/presentationml/2006/main">
   <p:cSld>
     <p:spTree>

</xml_diff>

<commit_message>
prev_size mmap challenge slides
</commit_message>
<xml_diff>
--- a/challenges/fd_poison/FdOverwrite.pptx
+++ b/challenges/fd_poison/FdOverwrite.pptx
@@ -32043,7 +32043,7 @@
           <a:p>
             <a:fld id="{2DA23E8D-1792-1541-9147-970A8DD8A355}" type="datetimeFigureOut">
               <a:rPr lang="en-US" smtClean="0"/>
-              <a:t>4/21/21</a:t>
+              <a:t>5/23/21</a:t>
             </a:fld>
             <a:endParaRPr lang="en-US" dirty="0"/>
           </a:p>
@@ -33017,7 +33017,7 @@
                 <a:latin typeface="Calibri"/>
               </a:rPr>
               <a:pPr/>
-              <a:t>4/21/21</a:t>
+              <a:t>5/23/21</a:t>
             </a:fld>
             <a:endParaRPr lang="en-US" dirty="0">
               <a:solidFill>
@@ -33270,7 +33270,7 @@
                 <a:latin typeface="Calibri"/>
               </a:rPr>
               <a:pPr/>
-              <a:t>4/21/21</a:t>
+              <a:t>5/23/21</a:t>
             </a:fld>
             <a:endParaRPr lang="en-US" dirty="0">
               <a:solidFill>
@@ -33485,7 +33485,7 @@
                 <a:latin typeface="Calibri"/>
               </a:rPr>
               <a:pPr/>
-              <a:t>4/21/21</a:t>
+              <a:t>5/23/21</a:t>
             </a:fld>
             <a:endParaRPr lang="en-US" dirty="0">
               <a:solidFill>
@@ -33883,7 +33883,7 @@
                 <a:latin typeface="Calibri"/>
               </a:rPr>
               <a:pPr/>
-              <a:t>4/21/21</a:t>
+              <a:t>5/23/21</a:t>
             </a:fld>
             <a:endParaRPr lang="en-US" dirty="0">
               <a:solidFill>
@@ -34225,7 +34225,7 @@
                 <a:latin typeface="Calibri"/>
               </a:rPr>
               <a:pPr/>
-              <a:t>4/21/21</a:t>
+              <a:t>5/23/21</a:t>
             </a:fld>
             <a:endParaRPr lang="en-US" dirty="0">
               <a:solidFill>
@@ -34553,7 +34553,7 @@
                 <a:latin typeface="Calibri"/>
               </a:rPr>
               <a:pPr/>
-              <a:t>4/21/21</a:t>
+              <a:t>5/23/21</a:t>
             </a:fld>
             <a:endParaRPr lang="en-US" dirty="0">
               <a:solidFill>
@@ -35042,7 +35042,7 @@
                 <a:latin typeface="Calibri"/>
               </a:rPr>
               <a:pPr/>
-              <a:t>4/21/21</a:t>
+              <a:t>5/23/21</a:t>
             </a:fld>
             <a:endParaRPr lang="en-US" dirty="0">
               <a:solidFill>
@@ -35225,7 +35225,7 @@
                 <a:latin typeface="Calibri"/>
               </a:rPr>
               <a:pPr/>
-              <a:t>4/21/21</a:t>
+              <a:t>5/23/21</a:t>
             </a:fld>
             <a:endParaRPr lang="en-US" dirty="0">
               <a:solidFill>
@@ -35471,7 +35471,7 @@
                 <a:latin typeface="Calibri"/>
               </a:rPr>
               <a:pPr/>
-              <a:t>4/21/21</a:t>
+              <a:t>5/23/21</a:t>
             </a:fld>
             <a:endParaRPr lang="en-US" dirty="0">
               <a:solidFill>
@@ -35813,7 +35813,7 @@
                 <a:latin typeface="Calibri"/>
               </a:rPr>
               <a:pPr/>
-              <a:t>4/21/21</a:t>
+              <a:t>5/23/21</a:t>
             </a:fld>
             <a:endParaRPr lang="en-US" dirty="0">
               <a:solidFill>
@@ -36105,7 +36105,7 @@
                 <a:latin typeface="Calibri"/>
               </a:rPr>
               <a:pPr/>
-              <a:t>4/21/21</a:t>
+              <a:t>5/23/21</a:t>
             </a:fld>
             <a:endParaRPr lang="en-US" dirty="0">
               <a:solidFill>
@@ -36355,7 +36355,7 @@
                 <a:latin typeface="Calibri"/>
               </a:rPr>
               <a:pPr defTabSz="914400"/>
-              <a:t>4/21/21</a:t>
+              <a:t>5/23/21</a:t>
             </a:fld>
             <a:endParaRPr lang="en-US" dirty="0">
               <a:solidFill>

</xml_diff>